<commit_message>
Update formatting and correct typos
</commit_message>
<xml_diff>
--- a/courses/2023 ACCP PKNCA introduction.pptx
+++ b/courses/2023 ACCP PKNCA introduction.pptx
@@ -279,7 +279,7 @@
           <a:p>
             <a:fld id="{32899983-469E-A94A-97D5-7083EBF9FF04}" type="datetimeFigureOut">
               <a:rPr lang="en-US" smtClean="0"/>
-              <a:t>8/28/2023</a:t>
+              <a:t>9/9/2023</a:t>
             </a:fld>
             <a:endParaRPr lang="en-US"/>
           </a:p>
@@ -477,7 +477,7 @@
           <a:p>
             <a:fld id="{32899983-469E-A94A-97D5-7083EBF9FF04}" type="datetimeFigureOut">
               <a:rPr lang="en-US" smtClean="0"/>
-              <a:t>8/28/2023</a:t>
+              <a:t>9/9/2023</a:t>
             </a:fld>
             <a:endParaRPr lang="en-US"/>
           </a:p>
@@ -685,7 +685,7 @@
           <a:p>
             <a:fld id="{32899983-469E-A94A-97D5-7083EBF9FF04}" type="datetimeFigureOut">
               <a:rPr lang="en-US" smtClean="0"/>
-              <a:t>8/28/2023</a:t>
+              <a:t>9/9/2023</a:t>
             </a:fld>
             <a:endParaRPr lang="en-US"/>
           </a:p>
@@ -883,7 +883,7 @@
           <a:p>
             <a:fld id="{32899983-469E-A94A-97D5-7083EBF9FF04}" type="datetimeFigureOut">
               <a:rPr lang="en-US" smtClean="0"/>
-              <a:t>8/28/2023</a:t>
+              <a:t>9/9/2023</a:t>
             </a:fld>
             <a:endParaRPr lang="en-US"/>
           </a:p>
@@ -1158,7 +1158,7 @@
           <a:p>
             <a:fld id="{32899983-469E-A94A-97D5-7083EBF9FF04}" type="datetimeFigureOut">
               <a:rPr lang="en-US" smtClean="0"/>
-              <a:t>8/28/2023</a:t>
+              <a:t>9/9/2023</a:t>
             </a:fld>
             <a:endParaRPr lang="en-US"/>
           </a:p>
@@ -1423,7 +1423,7 @@
           <a:p>
             <a:fld id="{32899983-469E-A94A-97D5-7083EBF9FF04}" type="datetimeFigureOut">
               <a:rPr lang="en-US" smtClean="0"/>
-              <a:t>8/28/2023</a:t>
+              <a:t>9/9/2023</a:t>
             </a:fld>
             <a:endParaRPr lang="en-US"/>
           </a:p>
@@ -1842,7 +1842,7 @@
           <a:p>
             <a:fld id="{32899983-469E-A94A-97D5-7083EBF9FF04}" type="datetimeFigureOut">
               <a:rPr lang="en-US" smtClean="0"/>
-              <a:t>8/28/2023</a:t>
+              <a:t>9/9/2023</a:t>
             </a:fld>
             <a:endParaRPr lang="en-US"/>
           </a:p>
@@ -1983,7 +1983,7 @@
           <a:p>
             <a:fld id="{32899983-469E-A94A-97D5-7083EBF9FF04}" type="datetimeFigureOut">
               <a:rPr lang="en-US" smtClean="0"/>
-              <a:t>8/28/2023</a:t>
+              <a:t>9/9/2023</a:t>
             </a:fld>
             <a:endParaRPr lang="en-US"/>
           </a:p>
@@ -2096,7 +2096,7 @@
           <a:p>
             <a:fld id="{32899983-469E-A94A-97D5-7083EBF9FF04}" type="datetimeFigureOut">
               <a:rPr lang="en-US" smtClean="0"/>
-              <a:t>8/28/2023</a:t>
+              <a:t>9/9/2023</a:t>
             </a:fld>
             <a:endParaRPr lang="en-US"/>
           </a:p>
@@ -2407,7 +2407,7 @@
           <a:p>
             <a:fld id="{32899983-469E-A94A-97D5-7083EBF9FF04}" type="datetimeFigureOut">
               <a:rPr lang="en-US" smtClean="0"/>
-              <a:t>8/28/2023</a:t>
+              <a:t>9/9/2023</a:t>
             </a:fld>
             <a:endParaRPr lang="en-US"/>
           </a:p>
@@ -2695,7 +2695,7 @@
           <a:p>
             <a:fld id="{32899983-469E-A94A-97D5-7083EBF9FF04}" type="datetimeFigureOut">
               <a:rPr lang="en-US" smtClean="0"/>
-              <a:t>8/28/2023</a:t>
+              <a:t>9/9/2023</a:t>
             </a:fld>
             <a:endParaRPr lang="en-US"/>
           </a:p>
@@ -2966,7 +2966,7 @@
           <a:p>
             <a:fld id="{32899983-469E-A94A-97D5-7083EBF9FF04}" type="datetimeFigureOut">
               <a:rPr lang="en-US" smtClean="0"/>
-              <a:t>8/28/2023</a:t>
+              <a:t>9/9/2023</a:t>
             </a:fld>
             <a:endParaRPr lang="en-US"/>
           </a:p>
@@ -5541,18 +5541,25 @@
               <a:t>             </a:t>
             </a:r>
             <a:r>
-              <a:rPr lang="en-US" sz="1600" dirty="0" err="1">
+              <a:rPr lang="en-US" sz="1600" err="1">
                 <a:latin typeface="Courier New" panose="02070309020205020404" pitchFamily="49" charset="0"/>
                 <a:cs typeface="Courier New" panose="02070309020205020404" pitchFamily="49" charset="0"/>
               </a:rPr>
               <a:t>aucinf</a:t>
             </a:r>
             <a:r>
+              <a:rPr lang="en-US" sz="1600">
+                <a:latin typeface="Courier New" panose="02070309020205020404" pitchFamily="49" charset="0"/>
+                <a:cs typeface="Courier New" panose="02070309020205020404" pitchFamily="49" charset="0"/>
+              </a:rPr>
+              <a:t>.obs=</a:t>
+            </a:r>
+            <a:r>
               <a:rPr lang="en-US" sz="1600" dirty="0">
                 <a:latin typeface="Courier New" panose="02070309020205020404" pitchFamily="49" charset="0"/>
                 <a:cs typeface="Courier New" panose="02070309020205020404" pitchFamily="49" charset="0"/>
               </a:rPr>
-              <a:t>=c(FALSE, TRUE))</a:t>
+              <a:t>c(FALSE, TRUE))</a:t>
             </a:r>
           </a:p>
           <a:p>
@@ -8498,6 +8505,9 @@
             <a:off x="623730" y="1371600"/>
             <a:ext cx="10730070" cy="4343400"/>
           </a:xfrm>
+          <a:solidFill>
+            <a:schemeClr val="bg1"/>
+          </a:solidFill>
         </p:spPr>
         <p:txBody>
           <a:bodyPr>
@@ -8541,21 +8551,7 @@
                 <a:latin typeface="Courier New" panose="02070309020205020404" pitchFamily="49" charset="0"/>
                 <a:cs typeface="Courier New" panose="02070309020205020404" pitchFamily="49" charset="0"/>
               </a:rPr>
-              <a:t> </a:t>
-            </a:r>
-            <a:r>
-              <a:rPr lang="en-US">
-                <a:latin typeface="Courier New" panose="02070309020205020404" pitchFamily="49" charset="0"/>
-                <a:cs typeface="Courier New" panose="02070309020205020404" pitchFamily="49" charset="0"/>
-              </a:rPr>
-              <a:t>&lt;- read.csv("</a:t>
-            </a:r>
-            <a:r>
-              <a:rPr lang="en-US" dirty="0">
-                <a:latin typeface="Courier New" panose="02070309020205020404" pitchFamily="49" charset="0"/>
-                <a:cs typeface="Courier New" panose="02070309020205020404" pitchFamily="49" charset="0"/>
-              </a:rPr>
-              <a:t>https://raw.githubusercontent.com/</a:t>
+              <a:t> &lt;- read.csv("https://raw.githubusercontent.com/</a:t>
             </a:r>
             <a:r>
               <a:rPr lang="en-US" dirty="0" err="1">

</xml_diff>